<commit_message>
Modeling fixes and visual updates
</commit_message>
<xml_diff>
--- a/doc/clinic-schematic-annotated-view.pptx
+++ b/doc/clinic-schematic-annotated-view.pptx
@@ -104,6 +104,11 @@
       </a:defRPr>
     </a:lvl9pPr>
   </p:defaultTextStyle>
+  <p:extLst>
+    <p:ext uri="{EFAFB233-063F-42B5-8137-9DF3F51BA10A}">
+      <p15:sldGuideLst xmlns:p15="http://schemas.microsoft.com/office/powerpoint/2012/main"/>
+    </p:ext>
+  </p:extLst>
 </p:presentation>
 </file>
 
@@ -238,7 +243,7 @@
           <a:p>
             <a:fld id="{3DFEBCED-C746-5540-B617-E24B176B3675}" type="datetimeFigureOut">
               <a:rPr lang="en-CH" smtClean="0"/>
-              <a:t>18.07.23</a:t>
+              <a:t>07.03.2024</a:t>
             </a:fld>
             <a:endParaRPr lang="en-CH"/>
           </a:p>
@@ -408,7 +413,7 @@
           <a:p>
             <a:fld id="{3DFEBCED-C746-5540-B617-E24B176B3675}" type="datetimeFigureOut">
               <a:rPr lang="en-CH" smtClean="0"/>
-              <a:t>18.07.23</a:t>
+              <a:t>07.03.2024</a:t>
             </a:fld>
             <a:endParaRPr lang="en-CH"/>
           </a:p>
@@ -588,7 +593,7 @@
           <a:p>
             <a:fld id="{3DFEBCED-C746-5540-B617-E24B176B3675}" type="datetimeFigureOut">
               <a:rPr lang="en-CH" smtClean="0"/>
-              <a:t>18.07.23</a:t>
+              <a:t>07.03.2024</a:t>
             </a:fld>
             <a:endParaRPr lang="en-CH"/>
           </a:p>
@@ -758,7 +763,7 @@
           <a:p>
             <a:fld id="{3DFEBCED-C746-5540-B617-E24B176B3675}" type="datetimeFigureOut">
               <a:rPr lang="en-CH" smtClean="0"/>
-              <a:t>18.07.23</a:t>
+              <a:t>07.03.2024</a:t>
             </a:fld>
             <a:endParaRPr lang="en-CH"/>
           </a:p>
@@ -1004,7 +1009,7 @@
           <a:p>
             <a:fld id="{3DFEBCED-C746-5540-B617-E24B176B3675}" type="datetimeFigureOut">
               <a:rPr lang="en-CH" smtClean="0"/>
-              <a:t>18.07.23</a:t>
+              <a:t>07.03.2024</a:t>
             </a:fld>
             <a:endParaRPr lang="en-CH"/>
           </a:p>
@@ -1236,7 +1241,7 @@
           <a:p>
             <a:fld id="{3DFEBCED-C746-5540-B617-E24B176B3675}" type="datetimeFigureOut">
               <a:rPr lang="en-CH" smtClean="0"/>
-              <a:t>18.07.23</a:t>
+              <a:t>07.03.2024</a:t>
             </a:fld>
             <a:endParaRPr lang="en-CH"/>
           </a:p>
@@ -1603,7 +1608,7 @@
           <a:p>
             <a:fld id="{3DFEBCED-C746-5540-B617-E24B176B3675}" type="datetimeFigureOut">
               <a:rPr lang="en-CH" smtClean="0"/>
-              <a:t>18.07.23</a:t>
+              <a:t>07.03.2024</a:t>
             </a:fld>
             <a:endParaRPr lang="en-CH"/>
           </a:p>
@@ -1721,7 +1726,7 @@
           <a:p>
             <a:fld id="{3DFEBCED-C746-5540-B617-E24B176B3675}" type="datetimeFigureOut">
               <a:rPr lang="en-CH" smtClean="0"/>
-              <a:t>18.07.23</a:t>
+              <a:t>07.03.2024</a:t>
             </a:fld>
             <a:endParaRPr lang="en-CH"/>
           </a:p>
@@ -1816,7 +1821,7 @@
           <a:p>
             <a:fld id="{3DFEBCED-C746-5540-B617-E24B176B3675}" type="datetimeFigureOut">
               <a:rPr lang="en-CH" smtClean="0"/>
-              <a:t>18.07.23</a:t>
+              <a:t>07.03.2024</a:t>
             </a:fld>
             <a:endParaRPr lang="en-CH"/>
           </a:p>
@@ -2093,7 +2098,7 @@
           <a:p>
             <a:fld id="{3DFEBCED-C746-5540-B617-E24B176B3675}" type="datetimeFigureOut">
               <a:rPr lang="en-CH" smtClean="0"/>
-              <a:t>18.07.23</a:t>
+              <a:t>07.03.2024</a:t>
             </a:fld>
             <a:endParaRPr lang="en-CH"/>
           </a:p>
@@ -2350,7 +2355,7 @@
           <a:p>
             <a:fld id="{3DFEBCED-C746-5540-B617-E24B176B3675}" type="datetimeFigureOut">
               <a:rPr lang="en-CH" smtClean="0"/>
-              <a:t>18.07.23</a:t>
+              <a:t>07.03.2024</a:t>
             </a:fld>
             <a:endParaRPr lang="en-CH"/>
           </a:p>
@@ -2563,7 +2568,7 @@
           <a:p>
             <a:fld id="{3DFEBCED-C746-5540-B617-E24B176B3675}" type="datetimeFigureOut">
               <a:rPr lang="en-CH" smtClean="0"/>
-              <a:t>18.07.23</a:t>
+              <a:t>07.03.2024</a:t>
             </a:fld>
             <a:endParaRPr lang="en-CH"/>
           </a:p>
@@ -2989,7 +2994,7 @@
         </p:blipFill>
         <p:spPr>
           <a:xfrm rot="16200000">
-            <a:off x="1230549" y="-1227844"/>
+            <a:off x="1230548" y="-1227845"/>
             <a:ext cx="3301464" cy="5762559"/>
           </a:xfrm>
           <a:prstGeom prst="rect">
@@ -3011,7 +3016,7 @@
         </p:nvSpPr>
         <p:spPr>
           <a:xfrm>
-            <a:off x="0" y="0"/>
+            <a:off x="0" y="6030"/>
             <a:ext cx="970498" cy="931229"/>
           </a:xfrm>
           <a:prstGeom prst="rect">
@@ -3103,6 +3108,124 @@
       </p:sp>
       <p:sp>
         <p:nvSpPr>
+          <p:cNvPr id="18" name="Rectangle 17">
+            <a:extLst>
+              <a:ext uri="{FF2B5EF4-FFF2-40B4-BE49-F238E27FC236}">
+                <a16:creationId xmlns:a16="http://schemas.microsoft.com/office/drawing/2014/main" id="{BB1E01B7-EAAE-5DE1-F7DF-5B83A7DC68DE}"/>
+              </a:ext>
+            </a:extLst>
+          </p:cNvPr>
+          <p:cNvSpPr/>
+          <p:nvPr/>
+        </p:nvSpPr>
+        <p:spPr>
+          <a:xfrm>
+            <a:off x="3060007" y="1319425"/>
+            <a:ext cx="1035159" cy="736445"/>
+          </a:xfrm>
+          <a:prstGeom prst="rect">
+            <a:avLst/>
+          </a:prstGeom>
+          <a:solidFill>
+            <a:srgbClr val="D9D9D9">
+              <a:alpha val="70196"/>
+            </a:srgbClr>
+          </a:solidFill>
+          <a:ln w="19050">
+            <a:solidFill>
+              <a:schemeClr val="tx1">
+                <a:alpha val="50196"/>
+              </a:schemeClr>
+            </a:solidFill>
+            <a:prstDash val="sysDash"/>
+          </a:ln>
+        </p:spPr>
+        <p:style>
+          <a:lnRef idx="2">
+            <a:schemeClr val="accent1">
+              <a:shade val="15000"/>
+            </a:schemeClr>
+          </a:lnRef>
+          <a:fillRef idx="1">
+            <a:schemeClr val="accent1"/>
+          </a:fillRef>
+          <a:effectRef idx="0">
+            <a:schemeClr val="accent1"/>
+          </a:effectRef>
+          <a:fontRef idx="minor">
+            <a:schemeClr val="lt1"/>
+          </a:fontRef>
+        </p:style>
+        <p:txBody>
+          <a:bodyPr rtlCol="0" anchor="ctr"/>
+          <a:lstStyle/>
+          <a:p>
+            <a:pPr algn="ctr"/>
+            <a:endParaRPr lang="en-CH"/>
+          </a:p>
+        </p:txBody>
+      </p:sp>
+      <p:sp>
+        <p:nvSpPr>
+          <p:cNvPr id="16" name="Rectangle 15">
+            <a:extLst>
+              <a:ext uri="{FF2B5EF4-FFF2-40B4-BE49-F238E27FC236}">
+                <a16:creationId xmlns:a16="http://schemas.microsoft.com/office/drawing/2014/main" id="{9E30AD0A-B6C3-4784-ADE4-0C643FFC9F60}"/>
+              </a:ext>
+            </a:extLst>
+          </p:cNvPr>
+          <p:cNvSpPr/>
+          <p:nvPr/>
+        </p:nvSpPr>
+        <p:spPr>
+          <a:xfrm>
+            <a:off x="111543" y="1010875"/>
+            <a:ext cx="1806361" cy="1154257"/>
+          </a:xfrm>
+          <a:prstGeom prst="rect">
+            <a:avLst/>
+          </a:prstGeom>
+          <a:solidFill>
+            <a:srgbClr val="D9D9D9">
+              <a:alpha val="70196"/>
+            </a:srgbClr>
+          </a:solidFill>
+          <a:ln w="19050">
+            <a:solidFill>
+              <a:schemeClr val="tx1">
+                <a:alpha val="50196"/>
+              </a:schemeClr>
+            </a:solidFill>
+            <a:prstDash val="sysDash"/>
+          </a:ln>
+        </p:spPr>
+        <p:style>
+          <a:lnRef idx="2">
+            <a:schemeClr val="accent1">
+              <a:shade val="15000"/>
+            </a:schemeClr>
+          </a:lnRef>
+          <a:fillRef idx="1">
+            <a:schemeClr val="accent1"/>
+          </a:fillRef>
+          <a:effectRef idx="0">
+            <a:schemeClr val="accent1"/>
+          </a:effectRef>
+          <a:fontRef idx="minor">
+            <a:schemeClr val="lt1"/>
+          </a:fontRef>
+        </p:style>
+        <p:txBody>
+          <a:bodyPr rtlCol="0" anchor="ctr"/>
+          <a:lstStyle/>
+          <a:p>
+            <a:pPr algn="ctr"/>
+            <a:endParaRPr lang="en-CH"/>
+          </a:p>
+        </p:txBody>
+      </p:sp>
+      <p:sp>
+        <p:nvSpPr>
           <p:cNvPr id="8" name="TextBox 7">
             <a:extLst>
               <a:ext uri="{FF2B5EF4-FFF2-40B4-BE49-F238E27FC236}">
@@ -3116,7 +3239,7 @@
         <p:spPr>
           <a:xfrm>
             <a:off x="437566" y="2308860"/>
-            <a:ext cx="1447332" cy="246221"/>
+            <a:ext cx="1002028" cy="215444"/>
           </a:xfrm>
           <a:prstGeom prst="rect">
             <a:avLst/>
@@ -3129,9 +3252,10 @@
           </a:bodyPr>
           <a:lstStyle/>
           <a:p>
-            <a:r>
-              <a:rPr lang="en-CH" sz="1000" b="1" dirty="0"/>
-              <a:t>Entrance</a:t>
+            <a:pPr algn="ctr"/>
+            <a:r>
+              <a:rPr lang="en-CH" sz="800" b="1" dirty="0"/>
+              <a:t>Entrance / Exit</a:t>
             </a:r>
           </a:p>
         </p:txBody>
@@ -3150,24 +3274,40 @@
         </p:nvSpPr>
         <p:spPr>
           <a:xfrm>
-            <a:off x="246832" y="1496934"/>
-            <a:ext cx="1447332" cy="246221"/>
+            <a:off x="419450" y="1509989"/>
+            <a:ext cx="921398" cy="153888"/>
           </a:xfrm>
           <a:prstGeom prst="rect">
             <a:avLst/>
           </a:prstGeom>
-          <a:noFill/>
         </p:spPr>
-        <p:txBody>
-          <a:bodyPr wrap="square" rtlCol="0">
+        <p:style>
+          <a:lnRef idx="2">
+            <a:schemeClr val="accent3">
+              <a:shade val="15000"/>
+            </a:schemeClr>
+          </a:lnRef>
+          <a:fillRef idx="1">
+            <a:schemeClr val="accent3"/>
+          </a:fillRef>
+          <a:effectRef idx="0">
+            <a:schemeClr val="accent3"/>
+          </a:effectRef>
+          <a:fontRef idx="minor">
+            <a:schemeClr val="lt1"/>
+          </a:fontRef>
+        </p:style>
+        <p:txBody>
+          <a:bodyPr wrap="square" lIns="0" tIns="0" rIns="0" bIns="0" rtlCol="0" anchor="ctr">
             <a:spAutoFit/>
           </a:bodyPr>
           <a:lstStyle/>
           <a:p>
-            <a:r>
-              <a:rPr lang="en-CH" sz="1000" b="1" dirty="0">
+            <a:pPr algn="ctr"/>
+            <a:r>
+              <a:rPr lang="en-CH" sz="1000" dirty="0">
                 <a:solidFill>
-                  <a:schemeClr val="accent1"/>
+                  <a:sysClr val="windowText" lastClr="000000"/>
                 </a:solidFill>
               </a:rPr>
               <a:t>Waiting room</a:t>
@@ -3189,23 +3329,35 @@
         </p:nvSpPr>
         <p:spPr>
           <a:xfrm rot="16200000">
-            <a:off x="1474764" y="1665545"/>
-            <a:ext cx="752954" cy="246221"/>
+            <a:off x="1336027" y="1578488"/>
+            <a:ext cx="828000" cy="307777"/>
           </a:xfrm>
           <a:prstGeom prst="rect">
             <a:avLst/>
           </a:prstGeom>
-          <a:noFill/>
+          <a:solidFill>
+            <a:schemeClr val="accent4">
+              <a:lumMod val="40000"/>
+              <a:lumOff val="60000"/>
+            </a:schemeClr>
+          </a:solidFill>
         </p:spPr>
         <p:txBody>
-          <a:bodyPr wrap="square" rtlCol="0">
+          <a:bodyPr wrap="square" lIns="36000" tIns="0" rIns="36000" bIns="0" rtlCol="0">
             <a:spAutoFit/>
           </a:bodyPr>
           <a:lstStyle/>
           <a:p>
-            <a:r>
-              <a:rPr lang="en-CH" sz="1000" b="1" dirty="0"/>
-              <a:t>Reception</a:t>
+            <a:pPr algn="ctr"/>
+            <a:r>
+              <a:rPr lang="en-CH" sz="1000" b="1" dirty="0">
+                <a:solidFill>
+                  <a:schemeClr val="accent4">
+                    <a:lumMod val="50000"/>
+                  </a:schemeClr>
+                </a:solidFill>
+              </a:rPr>
+              <a:t>Registration area</a:t>
             </a:r>
           </a:p>
         </p:txBody>
@@ -3264,88 +3416,10 @@
       </p:sp>
       <p:sp>
         <p:nvSpPr>
-          <p:cNvPr id="12" name="TextBox 11">
+          <p:cNvPr id="17" name="Rectangle 16">
             <a:extLst>
               <a:ext uri="{FF2B5EF4-FFF2-40B4-BE49-F238E27FC236}">
-                <a16:creationId xmlns:a16="http://schemas.microsoft.com/office/drawing/2014/main" id="{B142B4D1-812B-0B23-D71A-7B1EAC099BFD}"/>
-              </a:ext>
-            </a:extLst>
-          </p:cNvPr>
-          <p:cNvSpPr txBox="1"/>
-          <p:nvPr/>
-        </p:nvSpPr>
-        <p:spPr>
-          <a:xfrm>
-            <a:off x="2653759" y="1010876"/>
-            <a:ext cx="752954" cy="246221"/>
-          </a:xfrm>
-          <a:prstGeom prst="rect">
-            <a:avLst/>
-          </a:prstGeom>
-          <a:noFill/>
-        </p:spPr>
-        <p:txBody>
-          <a:bodyPr wrap="square" rtlCol="0">
-            <a:spAutoFit/>
-          </a:bodyPr>
-          <a:lstStyle/>
-          <a:p>
-            <a:r>
-              <a:rPr lang="en-CH" sz="1000" b="1" dirty="0">
-                <a:solidFill>
-                  <a:schemeClr val="accent1"/>
-                </a:solidFill>
-              </a:rPr>
-              <a:t>Corridor</a:t>
-            </a:r>
-          </a:p>
-        </p:txBody>
-      </p:sp>
-      <p:sp>
-        <p:nvSpPr>
-          <p:cNvPr id="15" name="TextBox 14">
-            <a:extLst>
-              <a:ext uri="{FF2B5EF4-FFF2-40B4-BE49-F238E27FC236}">
-                <a16:creationId xmlns:a16="http://schemas.microsoft.com/office/drawing/2014/main" id="{ABF43BD8-6AC4-328E-C00A-25025570147F}"/>
-              </a:ext>
-            </a:extLst>
-          </p:cNvPr>
-          <p:cNvSpPr txBox="1"/>
-          <p:nvPr/>
-        </p:nvSpPr>
-        <p:spPr>
-          <a:xfrm>
-            <a:off x="3211791" y="1653435"/>
-            <a:ext cx="752954" cy="246221"/>
-          </a:xfrm>
-          <a:prstGeom prst="rect">
-            <a:avLst/>
-          </a:prstGeom>
-          <a:noFill/>
-        </p:spPr>
-        <p:txBody>
-          <a:bodyPr wrap="square" rtlCol="0">
-            <a:spAutoFit/>
-          </a:bodyPr>
-          <a:lstStyle/>
-          <a:p>
-            <a:r>
-              <a:rPr lang="en-CH" sz="1000" b="1" dirty="0">
-                <a:solidFill>
-                  <a:schemeClr val="accent1"/>
-                </a:solidFill>
-              </a:rPr>
-              <a:t>TB room</a:t>
-            </a:r>
-          </a:p>
-        </p:txBody>
-      </p:sp>
-      <p:sp>
-        <p:nvSpPr>
-          <p:cNvPr id="16" name="Rectangle 15">
-            <a:extLst>
-              <a:ext uri="{FF2B5EF4-FFF2-40B4-BE49-F238E27FC236}">
-                <a16:creationId xmlns:a16="http://schemas.microsoft.com/office/drawing/2014/main" id="{9E30AD0A-B6C3-4784-ADE4-0C643FFC9F60}"/>
+                <a16:creationId xmlns:a16="http://schemas.microsoft.com/office/drawing/2014/main" id="{0DDE5863-2850-BE03-8345-6236BB5A5470}"/>
               </a:ext>
             </a:extLst>
           </p:cNvPr>
@@ -3354,16 +3428,22 @@
         </p:nvSpPr>
         <p:spPr>
           <a:xfrm>
-            <a:off x="117806" y="1010875"/>
-            <a:ext cx="1806361" cy="1154257"/>
+            <a:off x="1952448" y="1010875"/>
+            <a:ext cx="2182522" cy="246221"/>
           </a:xfrm>
           <a:prstGeom prst="rect">
             <a:avLst/>
           </a:prstGeom>
-          <a:noFill/>
-          <a:ln w="28575">
+          <a:solidFill>
+            <a:srgbClr val="D9D9D9">
+              <a:alpha val="70196"/>
+            </a:srgbClr>
+          </a:solidFill>
+          <a:ln w="19050">
             <a:solidFill>
-              <a:schemeClr val="accent1"/>
+              <a:schemeClr val="tx1">
+                <a:alpha val="50196"/>
+              </a:schemeClr>
             </a:solidFill>
             <a:prstDash val="sysDash"/>
           </a:ln>
@@ -3395,10 +3475,1577 @@
       </p:sp>
       <p:sp>
         <p:nvSpPr>
-          <p:cNvPr id="17" name="Rectangle 16">
+          <p:cNvPr id="12" name="TextBox 11">
             <a:extLst>
               <a:ext uri="{FF2B5EF4-FFF2-40B4-BE49-F238E27FC236}">
-                <a16:creationId xmlns:a16="http://schemas.microsoft.com/office/drawing/2014/main" id="{0DDE5863-2850-BE03-8345-6236BB5A5470}"/>
+                <a16:creationId xmlns:a16="http://schemas.microsoft.com/office/drawing/2014/main" id="{B142B4D1-812B-0B23-D71A-7B1EAC099BFD}"/>
+              </a:ext>
+            </a:extLst>
+          </p:cNvPr>
+          <p:cNvSpPr txBox="1"/>
+          <p:nvPr/>
+        </p:nvSpPr>
+        <p:spPr>
+          <a:xfrm>
+            <a:off x="2966985" y="1055246"/>
+            <a:ext cx="731951" cy="153888"/>
+          </a:xfrm>
+          <a:prstGeom prst="rect">
+            <a:avLst/>
+          </a:prstGeom>
+        </p:spPr>
+        <p:style>
+          <a:lnRef idx="2">
+            <a:schemeClr val="accent3">
+              <a:shade val="15000"/>
+            </a:schemeClr>
+          </a:lnRef>
+          <a:fillRef idx="1">
+            <a:schemeClr val="accent3"/>
+          </a:fillRef>
+          <a:effectRef idx="0">
+            <a:schemeClr val="accent3"/>
+          </a:effectRef>
+          <a:fontRef idx="minor">
+            <a:schemeClr val="lt1"/>
+          </a:fontRef>
+        </p:style>
+        <p:txBody>
+          <a:bodyPr wrap="square" lIns="0" tIns="0" rIns="0" bIns="0" rtlCol="0" anchor="ctr">
+            <a:spAutoFit/>
+          </a:bodyPr>
+          <a:lstStyle/>
+          <a:p>
+            <a:pPr algn="ctr"/>
+            <a:r>
+              <a:rPr lang="en-CH" sz="1000" dirty="0">
+                <a:solidFill>
+                  <a:sysClr val="windowText" lastClr="000000"/>
+                </a:solidFill>
+              </a:rPr>
+              <a:t>Corridor</a:t>
+            </a:r>
+          </a:p>
+        </p:txBody>
+      </p:sp>
+      <p:sp>
+        <p:nvSpPr>
+          <p:cNvPr id="15" name="TextBox 14">
+            <a:extLst>
+              <a:ext uri="{FF2B5EF4-FFF2-40B4-BE49-F238E27FC236}">
+                <a16:creationId xmlns:a16="http://schemas.microsoft.com/office/drawing/2014/main" id="{ABF43BD8-6AC4-328E-C00A-25025570147F}"/>
+              </a:ext>
+            </a:extLst>
+          </p:cNvPr>
+          <p:cNvSpPr txBox="1"/>
+          <p:nvPr/>
+        </p:nvSpPr>
+        <p:spPr>
+          <a:xfrm>
+            <a:off x="3356986" y="1683737"/>
+            <a:ext cx="642868" cy="153888"/>
+          </a:xfrm>
+          <a:prstGeom prst="rect">
+            <a:avLst/>
+          </a:prstGeom>
+        </p:spPr>
+        <p:style>
+          <a:lnRef idx="2">
+            <a:schemeClr val="accent3">
+              <a:shade val="15000"/>
+            </a:schemeClr>
+          </a:lnRef>
+          <a:fillRef idx="1">
+            <a:schemeClr val="accent3"/>
+          </a:fillRef>
+          <a:effectRef idx="0">
+            <a:schemeClr val="accent3"/>
+          </a:effectRef>
+          <a:fontRef idx="minor">
+            <a:schemeClr val="lt1"/>
+          </a:fontRef>
+        </p:style>
+        <p:txBody>
+          <a:bodyPr wrap="square" lIns="0" tIns="0" rIns="0" bIns="0" rtlCol="0" anchor="ctr">
+            <a:spAutoFit/>
+          </a:bodyPr>
+          <a:lstStyle/>
+          <a:p>
+            <a:pPr algn="ctr"/>
+            <a:r>
+              <a:rPr lang="en-CH" sz="1000" dirty="0">
+                <a:solidFill>
+                  <a:sysClr val="windowText" lastClr="000000"/>
+                </a:solidFill>
+              </a:rPr>
+              <a:t>TB room</a:t>
+            </a:r>
+          </a:p>
+        </p:txBody>
+      </p:sp>
+      <p:sp>
+        <p:nvSpPr>
+          <p:cNvPr id="2" name="TextBox 1">
+            <a:extLst>
+              <a:ext uri="{FF2B5EF4-FFF2-40B4-BE49-F238E27FC236}">
+                <a16:creationId xmlns:a16="http://schemas.microsoft.com/office/drawing/2014/main" id="{9F3B767A-B41E-928F-739F-18A4C7752AE7}"/>
+              </a:ext>
+            </a:extLst>
+          </p:cNvPr>
+          <p:cNvSpPr txBox="1"/>
+          <p:nvPr/>
+        </p:nvSpPr>
+        <p:spPr>
+          <a:xfrm rot="16200000">
+            <a:off x="1447431" y="701981"/>
+            <a:ext cx="382205" cy="215444"/>
+          </a:xfrm>
+          <a:prstGeom prst="rect">
+            <a:avLst/>
+          </a:prstGeom>
+          <a:noFill/>
+        </p:spPr>
+        <p:txBody>
+          <a:bodyPr wrap="square" rtlCol="0">
+            <a:spAutoFit/>
+          </a:bodyPr>
+          <a:lstStyle/>
+          <a:p>
+            <a:r>
+              <a:rPr lang="en-CH" sz="800" b="1" dirty="0"/>
+              <a:t>Exit</a:t>
+            </a:r>
+          </a:p>
+        </p:txBody>
+      </p:sp>
+      <p:cxnSp>
+        <p:nvCxnSpPr>
+          <p:cNvPr id="4" name="Straight Arrow Connector 3">
+            <a:extLst>
+              <a:ext uri="{FF2B5EF4-FFF2-40B4-BE49-F238E27FC236}">
+                <a16:creationId xmlns:a16="http://schemas.microsoft.com/office/drawing/2014/main" id="{00131DE4-9D78-C6FC-6659-EAFCC082E62F}"/>
+              </a:ext>
+            </a:extLst>
+          </p:cNvPr>
+          <p:cNvCxnSpPr>
+            <a:cxnSpLocks/>
+          </p:cNvCxnSpPr>
+          <p:nvPr/>
+        </p:nvCxnSpPr>
+        <p:spPr>
+          <a:xfrm flipV="1">
+            <a:off x="1635835" y="444483"/>
+            <a:ext cx="0" cy="226661"/>
+          </a:xfrm>
+          <a:prstGeom prst="straightConnector1">
+            <a:avLst/>
+          </a:prstGeom>
+          <a:ln w="19050">
+            <a:solidFill>
+              <a:schemeClr val="tx1"/>
+            </a:solidFill>
+            <a:tailEnd type="triangle"/>
+          </a:ln>
+        </p:spPr>
+        <p:style>
+          <a:lnRef idx="1">
+            <a:schemeClr val="accent1"/>
+          </a:lnRef>
+          <a:fillRef idx="0">
+            <a:schemeClr val="accent1"/>
+          </a:fillRef>
+          <a:effectRef idx="0">
+            <a:schemeClr val="accent1"/>
+          </a:effectRef>
+          <a:fontRef idx="minor">
+            <a:schemeClr val="tx1"/>
+          </a:fontRef>
+        </p:style>
+      </p:cxnSp>
+      <p:sp>
+        <p:nvSpPr>
+          <p:cNvPr id="13" name="TextBox 12">
+            <a:extLst>
+              <a:ext uri="{FF2B5EF4-FFF2-40B4-BE49-F238E27FC236}">
+                <a16:creationId xmlns:a16="http://schemas.microsoft.com/office/drawing/2014/main" id="{8381D26E-869C-1349-8D39-CDD1FB19FD4C}"/>
+              </a:ext>
+            </a:extLst>
+          </p:cNvPr>
+          <p:cNvSpPr txBox="1"/>
+          <p:nvPr/>
+        </p:nvSpPr>
+        <p:spPr>
+          <a:xfrm>
+            <a:off x="4103341" y="1022137"/>
+            <a:ext cx="382205" cy="215444"/>
+          </a:xfrm>
+          <a:prstGeom prst="rect">
+            <a:avLst/>
+          </a:prstGeom>
+          <a:noFill/>
+        </p:spPr>
+        <p:txBody>
+          <a:bodyPr wrap="square" rtlCol="0">
+            <a:spAutoFit/>
+          </a:bodyPr>
+          <a:lstStyle/>
+          <a:p>
+            <a:r>
+              <a:rPr lang="en-CH" sz="800" b="1" dirty="0"/>
+              <a:t>Exit</a:t>
+            </a:r>
+          </a:p>
+        </p:txBody>
+      </p:sp>
+      <p:cxnSp>
+        <p:nvCxnSpPr>
+          <p:cNvPr id="19" name="Straight Arrow Connector 18">
+            <a:extLst>
+              <a:ext uri="{FF2B5EF4-FFF2-40B4-BE49-F238E27FC236}">
+                <a16:creationId xmlns:a16="http://schemas.microsoft.com/office/drawing/2014/main" id="{7E2A1E20-6634-F443-086A-E9F5D8CA3844}"/>
+              </a:ext>
+            </a:extLst>
+          </p:cNvPr>
+          <p:cNvCxnSpPr>
+            <a:cxnSpLocks/>
+            <a:stCxn id="13" idx="0"/>
+          </p:cNvCxnSpPr>
+          <p:nvPr/>
+        </p:nvCxnSpPr>
+        <p:spPr>
+          <a:xfrm flipV="1">
+            <a:off x="4294444" y="815923"/>
+            <a:ext cx="0" cy="206214"/>
+          </a:xfrm>
+          <a:prstGeom prst="straightConnector1">
+            <a:avLst/>
+          </a:prstGeom>
+          <a:ln w="19050">
+            <a:solidFill>
+              <a:schemeClr val="tx1"/>
+            </a:solidFill>
+            <a:tailEnd type="triangle"/>
+          </a:ln>
+        </p:spPr>
+        <p:style>
+          <a:lnRef idx="1">
+            <a:schemeClr val="accent1"/>
+          </a:lnRef>
+          <a:fillRef idx="0">
+            <a:schemeClr val="accent1"/>
+          </a:fillRef>
+          <a:effectRef idx="0">
+            <a:schemeClr val="accent1"/>
+          </a:effectRef>
+          <a:fontRef idx="minor">
+            <a:schemeClr val="tx1"/>
+          </a:fontRef>
+        </p:style>
+      </p:cxnSp>
+      <p:cxnSp>
+        <p:nvCxnSpPr>
+          <p:cNvPr id="21" name="Straight Arrow Connector 20">
+            <a:extLst>
+              <a:ext uri="{FF2B5EF4-FFF2-40B4-BE49-F238E27FC236}">
+                <a16:creationId xmlns:a16="http://schemas.microsoft.com/office/drawing/2014/main" id="{1A42F3EA-400C-B569-2C25-DCE09C167024}"/>
+              </a:ext>
+            </a:extLst>
+          </p:cNvPr>
+          <p:cNvCxnSpPr>
+            <a:cxnSpLocks/>
+          </p:cNvCxnSpPr>
+          <p:nvPr/>
+        </p:nvCxnSpPr>
+        <p:spPr>
+          <a:xfrm rot="5400000" flipV="1">
+            <a:off x="4531194" y="1031918"/>
+            <a:ext cx="0" cy="226661"/>
+          </a:xfrm>
+          <a:prstGeom prst="straightConnector1">
+            <a:avLst/>
+          </a:prstGeom>
+          <a:ln w="19050">
+            <a:solidFill>
+              <a:schemeClr val="tx1"/>
+            </a:solidFill>
+            <a:tailEnd type="triangle"/>
+          </a:ln>
+        </p:spPr>
+        <p:style>
+          <a:lnRef idx="1">
+            <a:schemeClr val="accent1"/>
+          </a:lnRef>
+          <a:fillRef idx="0">
+            <a:schemeClr val="accent1"/>
+          </a:fillRef>
+          <a:effectRef idx="0">
+            <a:schemeClr val="accent1"/>
+          </a:effectRef>
+          <a:fontRef idx="minor">
+            <a:schemeClr val="tx1"/>
+          </a:fontRef>
+        </p:style>
+      </p:cxnSp>
+      <p:sp>
+        <p:nvSpPr>
+          <p:cNvPr id="25" name="TextBox 24">
+            <a:extLst>
+              <a:ext uri="{FF2B5EF4-FFF2-40B4-BE49-F238E27FC236}">
+                <a16:creationId xmlns:a16="http://schemas.microsoft.com/office/drawing/2014/main" id="{5EFABB93-D1F4-9B70-6D6C-9E9F7C606625}"/>
+              </a:ext>
+            </a:extLst>
+          </p:cNvPr>
+          <p:cNvSpPr txBox="1"/>
+          <p:nvPr/>
+        </p:nvSpPr>
+        <p:spPr>
+          <a:xfrm>
+            <a:off x="2161029" y="1407213"/>
+            <a:ext cx="790447" cy="215444"/>
+          </a:xfrm>
+          <a:prstGeom prst="rect">
+            <a:avLst/>
+          </a:prstGeom>
+          <a:noFill/>
+        </p:spPr>
+        <p:txBody>
+          <a:bodyPr wrap="square" rtlCol="0">
+            <a:spAutoFit/>
+          </a:bodyPr>
+          <a:lstStyle/>
+          <a:p>
+            <a:r>
+              <a:rPr lang="en-CH" sz="800" b="1" dirty="0"/>
+              <a:t>Staff room</a:t>
+            </a:r>
+          </a:p>
+        </p:txBody>
+      </p:sp>
+      <p:sp>
+        <p:nvSpPr>
+          <p:cNvPr id="26" name="TextBox 25">
+            <a:extLst>
+              <a:ext uri="{FF2B5EF4-FFF2-40B4-BE49-F238E27FC236}">
+                <a16:creationId xmlns:a16="http://schemas.microsoft.com/office/drawing/2014/main" id="{BD914188-8435-D6B8-2F3E-3DD918381FEF}"/>
+              </a:ext>
+            </a:extLst>
+          </p:cNvPr>
+          <p:cNvSpPr txBox="1"/>
+          <p:nvPr/>
+        </p:nvSpPr>
+        <p:spPr>
+          <a:xfrm>
+            <a:off x="1881682" y="646368"/>
+            <a:ext cx="790447" cy="215444"/>
+          </a:xfrm>
+          <a:prstGeom prst="rect">
+            <a:avLst/>
+          </a:prstGeom>
+          <a:noFill/>
+        </p:spPr>
+        <p:txBody>
+          <a:bodyPr wrap="square" rtlCol="0">
+            <a:spAutoFit/>
+          </a:bodyPr>
+          <a:lstStyle/>
+          <a:p>
+            <a:r>
+              <a:rPr lang="en-CH" sz="800" b="1" dirty="0"/>
+              <a:t>Care room</a:t>
+            </a:r>
+          </a:p>
+        </p:txBody>
+      </p:sp>
+      <p:sp>
+        <p:nvSpPr>
+          <p:cNvPr id="27" name="TextBox 26">
+            <a:extLst>
+              <a:ext uri="{FF2B5EF4-FFF2-40B4-BE49-F238E27FC236}">
+                <a16:creationId xmlns:a16="http://schemas.microsoft.com/office/drawing/2014/main" id="{4D743313-8F54-821C-8106-A6E92AA1405A}"/>
+              </a:ext>
+            </a:extLst>
+          </p:cNvPr>
+          <p:cNvSpPr txBox="1"/>
+          <p:nvPr/>
+        </p:nvSpPr>
+        <p:spPr>
+          <a:xfrm>
+            <a:off x="2879725" y="479475"/>
+            <a:ext cx="449629" cy="338554"/>
+          </a:xfrm>
+          <a:prstGeom prst="rect">
+            <a:avLst/>
+          </a:prstGeom>
+          <a:noFill/>
+        </p:spPr>
+        <p:txBody>
+          <a:bodyPr wrap="square" rtlCol="0">
+            <a:spAutoFit/>
+          </a:bodyPr>
+          <a:lstStyle/>
+          <a:p>
+            <a:r>
+              <a:rPr lang="en-CH" sz="800" b="1" dirty="0"/>
+              <a:t>Care </a:t>
+            </a:r>
+          </a:p>
+          <a:p>
+            <a:r>
+              <a:rPr lang="en-CH" sz="800" b="1" dirty="0"/>
+              <a:t>room</a:t>
+            </a:r>
+          </a:p>
+        </p:txBody>
+      </p:sp>
+      <p:sp>
+        <p:nvSpPr>
+          <p:cNvPr id="28" name="TextBox 27">
+            <a:extLst>
+              <a:ext uri="{FF2B5EF4-FFF2-40B4-BE49-F238E27FC236}">
+                <a16:creationId xmlns:a16="http://schemas.microsoft.com/office/drawing/2014/main" id="{39EF9D56-D750-AD67-1F32-5783B7D319CB}"/>
+              </a:ext>
+            </a:extLst>
+          </p:cNvPr>
+          <p:cNvSpPr txBox="1"/>
+          <p:nvPr/>
+        </p:nvSpPr>
+        <p:spPr>
+          <a:xfrm>
+            <a:off x="3286206" y="495163"/>
+            <a:ext cx="449630" cy="338554"/>
+          </a:xfrm>
+          <a:prstGeom prst="rect">
+            <a:avLst/>
+          </a:prstGeom>
+          <a:noFill/>
+        </p:spPr>
+        <p:txBody>
+          <a:bodyPr wrap="square" rtlCol="0">
+            <a:spAutoFit/>
+          </a:bodyPr>
+          <a:lstStyle/>
+          <a:p>
+            <a:r>
+              <a:rPr lang="en-CH" sz="800" b="1" dirty="0"/>
+              <a:t>Care </a:t>
+            </a:r>
+          </a:p>
+          <a:p>
+            <a:r>
+              <a:rPr lang="en-CH" sz="800" b="1" dirty="0"/>
+              <a:t>room</a:t>
+            </a:r>
+          </a:p>
+        </p:txBody>
+      </p:sp>
+      <p:grpSp>
+        <p:nvGrpSpPr>
+          <p:cNvPr id="29" name="Group 28">
+            <a:extLst>
+              <a:ext uri="{FF2B5EF4-FFF2-40B4-BE49-F238E27FC236}">
+                <a16:creationId xmlns:a16="http://schemas.microsoft.com/office/drawing/2014/main" id="{77F9E74C-7C1D-EF8D-8B88-883F537A4873}"/>
+              </a:ext>
+            </a:extLst>
+          </p:cNvPr>
+          <p:cNvGrpSpPr>
+            <a:grpSpLocks noChangeAspect="1"/>
+          </p:cNvGrpSpPr>
+          <p:nvPr/>
+        </p:nvGrpSpPr>
+        <p:grpSpPr>
+          <a:xfrm>
+            <a:off x="2698652" y="1047017"/>
+            <a:ext cx="200941" cy="162000"/>
+            <a:chOff x="1929577" y="539626"/>
+            <a:chExt cx="267950" cy="216024"/>
+          </a:xfrm>
+        </p:grpSpPr>
+        <p:sp>
+          <p:nvSpPr>
+            <p:cNvPr id="30" name="Rounded Rectangle 29">
+              <a:extLst>
+                <a:ext uri="{FF2B5EF4-FFF2-40B4-BE49-F238E27FC236}">
+                  <a16:creationId xmlns:a16="http://schemas.microsoft.com/office/drawing/2014/main" id="{E18CE7D2-83FA-085C-4C76-7F7E1104FC0E}"/>
+                </a:ext>
+              </a:extLst>
+            </p:cNvPr>
+            <p:cNvSpPr/>
+            <p:nvPr/>
+          </p:nvSpPr>
+          <p:spPr>
+            <a:xfrm>
+              <a:off x="1929577" y="539626"/>
+              <a:ext cx="267950" cy="216024"/>
+            </a:xfrm>
+            <a:prstGeom prst="roundRect">
+              <a:avLst/>
+            </a:prstGeom>
+            <a:ln/>
+          </p:spPr>
+          <p:style>
+            <a:lnRef idx="2">
+              <a:schemeClr val="accent2">
+                <a:shade val="15000"/>
+              </a:schemeClr>
+            </a:lnRef>
+            <a:fillRef idx="1">
+              <a:schemeClr val="accent2"/>
+            </a:fillRef>
+            <a:effectRef idx="0">
+              <a:schemeClr val="accent2"/>
+            </a:effectRef>
+            <a:fontRef idx="minor">
+              <a:schemeClr val="lt1"/>
+            </a:fontRef>
+          </p:style>
+          <p:txBody>
+            <a:bodyPr rtlCol="0" anchor="ctr"/>
+            <a:lstStyle/>
+            <a:p>
+              <a:pPr algn="ctr"/>
+              <a:endParaRPr lang="en-CH"/>
+            </a:p>
+          </p:txBody>
+        </p:sp>
+        <p:sp>
+          <p:nvSpPr>
+            <p:cNvPr id="31" name="Oval 30">
+              <a:extLst>
+                <a:ext uri="{FF2B5EF4-FFF2-40B4-BE49-F238E27FC236}">
+                  <a16:creationId xmlns:a16="http://schemas.microsoft.com/office/drawing/2014/main" id="{98E3EECC-BE65-E59A-FFEA-995A96A7E79B}"/>
+                </a:ext>
+              </a:extLst>
+            </p:cNvPr>
+            <p:cNvSpPr/>
+            <p:nvPr/>
+          </p:nvSpPr>
+          <p:spPr>
+            <a:xfrm>
+              <a:off x="1972783" y="593017"/>
+              <a:ext cx="36000" cy="36000"/>
+            </a:xfrm>
+            <a:prstGeom prst="ellipse">
+              <a:avLst/>
+            </a:prstGeom>
+            <a:ln/>
+          </p:spPr>
+          <p:style>
+            <a:lnRef idx="2">
+              <a:schemeClr val="accent2">
+                <a:shade val="15000"/>
+              </a:schemeClr>
+            </a:lnRef>
+            <a:fillRef idx="1">
+              <a:schemeClr val="accent2"/>
+            </a:fillRef>
+            <a:effectRef idx="0">
+              <a:schemeClr val="accent2"/>
+            </a:effectRef>
+            <a:fontRef idx="minor">
+              <a:schemeClr val="lt1"/>
+            </a:fontRef>
+          </p:style>
+          <p:txBody>
+            <a:bodyPr rtlCol="0" anchor="ctr"/>
+            <a:lstStyle/>
+            <a:p>
+              <a:pPr algn="ctr"/>
+              <a:endParaRPr lang="en-CH"/>
+            </a:p>
+          </p:txBody>
+        </p:sp>
+        <p:sp>
+          <p:nvSpPr>
+            <p:cNvPr id="32" name="Rounded Rectangle 31">
+              <a:extLst>
+                <a:ext uri="{FF2B5EF4-FFF2-40B4-BE49-F238E27FC236}">
+                  <a16:creationId xmlns:a16="http://schemas.microsoft.com/office/drawing/2014/main" id="{CF702AC4-E888-DE93-2D22-97D2D58D1D40}"/>
+                </a:ext>
+              </a:extLst>
+            </p:cNvPr>
+            <p:cNvSpPr/>
+            <p:nvPr/>
+          </p:nvSpPr>
+          <p:spPr>
+            <a:xfrm>
+              <a:off x="1974502" y="665642"/>
+              <a:ext cx="191665" cy="36000"/>
+            </a:xfrm>
+            <a:prstGeom prst="roundRect">
+              <a:avLst/>
+            </a:prstGeom>
+            <a:ln/>
+          </p:spPr>
+          <p:style>
+            <a:lnRef idx="2">
+              <a:schemeClr val="accent2">
+                <a:shade val="15000"/>
+              </a:schemeClr>
+            </a:lnRef>
+            <a:fillRef idx="1">
+              <a:schemeClr val="accent2"/>
+            </a:fillRef>
+            <a:effectRef idx="0">
+              <a:schemeClr val="accent2"/>
+            </a:effectRef>
+            <a:fontRef idx="minor">
+              <a:schemeClr val="lt1"/>
+            </a:fontRef>
+          </p:style>
+          <p:txBody>
+            <a:bodyPr rtlCol="0" anchor="ctr"/>
+            <a:lstStyle/>
+            <a:p>
+              <a:pPr algn="ctr"/>
+              <a:endParaRPr lang="en-CH"/>
+            </a:p>
+          </p:txBody>
+        </p:sp>
+        <p:sp>
+          <p:nvSpPr>
+            <p:cNvPr id="33" name="Rounded Rectangle 32">
+              <a:extLst>
+                <a:ext uri="{FF2B5EF4-FFF2-40B4-BE49-F238E27FC236}">
+                  <a16:creationId xmlns:a16="http://schemas.microsoft.com/office/drawing/2014/main" id="{705ED98A-3302-B009-6699-608A65E8A740}"/>
+                </a:ext>
+              </a:extLst>
+            </p:cNvPr>
+            <p:cNvSpPr/>
+            <p:nvPr/>
+          </p:nvSpPr>
+          <p:spPr>
+            <a:xfrm>
+              <a:off x="2058167" y="593017"/>
+              <a:ext cx="108000" cy="36000"/>
+            </a:xfrm>
+            <a:prstGeom prst="roundRect">
+              <a:avLst/>
+            </a:prstGeom>
+            <a:ln/>
+          </p:spPr>
+          <p:style>
+            <a:lnRef idx="2">
+              <a:schemeClr val="accent2">
+                <a:shade val="15000"/>
+              </a:schemeClr>
+            </a:lnRef>
+            <a:fillRef idx="1">
+              <a:schemeClr val="accent2"/>
+            </a:fillRef>
+            <a:effectRef idx="0">
+              <a:schemeClr val="accent2"/>
+            </a:effectRef>
+            <a:fontRef idx="minor">
+              <a:schemeClr val="lt1"/>
+            </a:fontRef>
+          </p:style>
+          <p:txBody>
+            <a:bodyPr rtlCol="0" anchor="ctr"/>
+            <a:lstStyle/>
+            <a:p>
+              <a:pPr algn="ctr"/>
+              <a:endParaRPr lang="en-CH"/>
+            </a:p>
+          </p:txBody>
+        </p:sp>
+      </p:grpSp>
+      <p:grpSp>
+        <p:nvGrpSpPr>
+          <p:cNvPr id="34" name="Group 33">
+            <a:extLst>
+              <a:ext uri="{FF2B5EF4-FFF2-40B4-BE49-F238E27FC236}">
+                <a16:creationId xmlns:a16="http://schemas.microsoft.com/office/drawing/2014/main" id="{3FEC10FD-7A17-6EF5-5C37-3A799B829764}"/>
+              </a:ext>
+            </a:extLst>
+          </p:cNvPr>
+          <p:cNvGrpSpPr>
+            <a:grpSpLocks noChangeAspect="1"/>
+          </p:cNvGrpSpPr>
+          <p:nvPr/>
+        </p:nvGrpSpPr>
+        <p:grpSpPr>
+          <a:xfrm>
+            <a:off x="190024" y="1060283"/>
+            <a:ext cx="200941" cy="162000"/>
+            <a:chOff x="1929577" y="539626"/>
+            <a:chExt cx="267950" cy="216024"/>
+          </a:xfrm>
+        </p:grpSpPr>
+        <p:sp>
+          <p:nvSpPr>
+            <p:cNvPr id="35" name="Rounded Rectangle 34">
+              <a:extLst>
+                <a:ext uri="{FF2B5EF4-FFF2-40B4-BE49-F238E27FC236}">
+                  <a16:creationId xmlns:a16="http://schemas.microsoft.com/office/drawing/2014/main" id="{2AA4398C-FA6B-F89C-CB90-778274BD552B}"/>
+                </a:ext>
+              </a:extLst>
+            </p:cNvPr>
+            <p:cNvSpPr/>
+            <p:nvPr/>
+          </p:nvSpPr>
+          <p:spPr>
+            <a:xfrm>
+              <a:off x="1929577" y="539626"/>
+              <a:ext cx="267950" cy="216024"/>
+            </a:xfrm>
+            <a:prstGeom prst="roundRect">
+              <a:avLst/>
+            </a:prstGeom>
+            <a:ln/>
+          </p:spPr>
+          <p:style>
+            <a:lnRef idx="2">
+              <a:schemeClr val="accent2">
+                <a:shade val="15000"/>
+              </a:schemeClr>
+            </a:lnRef>
+            <a:fillRef idx="1">
+              <a:schemeClr val="accent2"/>
+            </a:fillRef>
+            <a:effectRef idx="0">
+              <a:schemeClr val="accent2"/>
+            </a:effectRef>
+            <a:fontRef idx="minor">
+              <a:schemeClr val="lt1"/>
+            </a:fontRef>
+          </p:style>
+          <p:txBody>
+            <a:bodyPr rtlCol="0" anchor="ctr"/>
+            <a:lstStyle/>
+            <a:p>
+              <a:pPr algn="ctr"/>
+              <a:endParaRPr lang="en-CH"/>
+            </a:p>
+          </p:txBody>
+        </p:sp>
+        <p:sp>
+          <p:nvSpPr>
+            <p:cNvPr id="36" name="Oval 35">
+              <a:extLst>
+                <a:ext uri="{FF2B5EF4-FFF2-40B4-BE49-F238E27FC236}">
+                  <a16:creationId xmlns:a16="http://schemas.microsoft.com/office/drawing/2014/main" id="{D400D700-A16F-E709-53AD-78D72A2BAB8E}"/>
+                </a:ext>
+              </a:extLst>
+            </p:cNvPr>
+            <p:cNvSpPr/>
+            <p:nvPr/>
+          </p:nvSpPr>
+          <p:spPr>
+            <a:xfrm>
+              <a:off x="1972783" y="593017"/>
+              <a:ext cx="36000" cy="36000"/>
+            </a:xfrm>
+            <a:prstGeom prst="ellipse">
+              <a:avLst/>
+            </a:prstGeom>
+            <a:ln/>
+          </p:spPr>
+          <p:style>
+            <a:lnRef idx="2">
+              <a:schemeClr val="accent2">
+                <a:shade val="15000"/>
+              </a:schemeClr>
+            </a:lnRef>
+            <a:fillRef idx="1">
+              <a:schemeClr val="accent2"/>
+            </a:fillRef>
+            <a:effectRef idx="0">
+              <a:schemeClr val="accent2"/>
+            </a:effectRef>
+            <a:fontRef idx="minor">
+              <a:schemeClr val="lt1"/>
+            </a:fontRef>
+          </p:style>
+          <p:txBody>
+            <a:bodyPr rtlCol="0" anchor="ctr"/>
+            <a:lstStyle/>
+            <a:p>
+              <a:pPr algn="ctr"/>
+              <a:endParaRPr lang="en-CH"/>
+            </a:p>
+          </p:txBody>
+        </p:sp>
+        <p:sp>
+          <p:nvSpPr>
+            <p:cNvPr id="37" name="Rounded Rectangle 36">
+              <a:extLst>
+                <a:ext uri="{FF2B5EF4-FFF2-40B4-BE49-F238E27FC236}">
+                  <a16:creationId xmlns:a16="http://schemas.microsoft.com/office/drawing/2014/main" id="{0475CA65-E57F-6D34-8AA3-C483416B5DF0}"/>
+                </a:ext>
+              </a:extLst>
+            </p:cNvPr>
+            <p:cNvSpPr/>
+            <p:nvPr/>
+          </p:nvSpPr>
+          <p:spPr>
+            <a:xfrm>
+              <a:off x="1974502" y="665642"/>
+              <a:ext cx="191665" cy="36000"/>
+            </a:xfrm>
+            <a:prstGeom prst="roundRect">
+              <a:avLst/>
+            </a:prstGeom>
+            <a:ln/>
+          </p:spPr>
+          <p:style>
+            <a:lnRef idx="2">
+              <a:schemeClr val="accent2">
+                <a:shade val="15000"/>
+              </a:schemeClr>
+            </a:lnRef>
+            <a:fillRef idx="1">
+              <a:schemeClr val="accent2"/>
+            </a:fillRef>
+            <a:effectRef idx="0">
+              <a:schemeClr val="accent2"/>
+            </a:effectRef>
+            <a:fontRef idx="minor">
+              <a:schemeClr val="lt1"/>
+            </a:fontRef>
+          </p:style>
+          <p:txBody>
+            <a:bodyPr rtlCol="0" anchor="ctr"/>
+            <a:lstStyle/>
+            <a:p>
+              <a:pPr algn="ctr"/>
+              <a:endParaRPr lang="en-CH"/>
+            </a:p>
+          </p:txBody>
+        </p:sp>
+        <p:sp>
+          <p:nvSpPr>
+            <p:cNvPr id="38" name="Rounded Rectangle 37">
+              <a:extLst>
+                <a:ext uri="{FF2B5EF4-FFF2-40B4-BE49-F238E27FC236}">
+                  <a16:creationId xmlns:a16="http://schemas.microsoft.com/office/drawing/2014/main" id="{958A739C-751F-3EB8-FD1D-30BBE3979088}"/>
+                </a:ext>
+              </a:extLst>
+            </p:cNvPr>
+            <p:cNvSpPr/>
+            <p:nvPr/>
+          </p:nvSpPr>
+          <p:spPr>
+            <a:xfrm>
+              <a:off x="2058167" y="593017"/>
+              <a:ext cx="108000" cy="36000"/>
+            </a:xfrm>
+            <a:prstGeom prst="roundRect">
+              <a:avLst/>
+            </a:prstGeom>
+            <a:ln/>
+          </p:spPr>
+          <p:style>
+            <a:lnRef idx="2">
+              <a:schemeClr val="accent2">
+                <a:shade val="15000"/>
+              </a:schemeClr>
+            </a:lnRef>
+            <a:fillRef idx="1">
+              <a:schemeClr val="accent2"/>
+            </a:fillRef>
+            <a:effectRef idx="0">
+              <a:schemeClr val="accent2"/>
+            </a:effectRef>
+            <a:fontRef idx="minor">
+              <a:schemeClr val="lt1"/>
+            </a:fontRef>
+          </p:style>
+          <p:txBody>
+            <a:bodyPr rtlCol="0" anchor="ctr"/>
+            <a:lstStyle/>
+            <a:p>
+              <a:pPr algn="ctr"/>
+              <a:endParaRPr lang="en-CH"/>
+            </a:p>
+          </p:txBody>
+        </p:sp>
+      </p:grpSp>
+      <p:grpSp>
+        <p:nvGrpSpPr>
+          <p:cNvPr id="39" name="Group 38">
+            <a:extLst>
+              <a:ext uri="{FF2B5EF4-FFF2-40B4-BE49-F238E27FC236}">
+                <a16:creationId xmlns:a16="http://schemas.microsoft.com/office/drawing/2014/main" id="{DD242E26-76F4-4751-2C51-FAAB34DF0151}"/>
+              </a:ext>
+            </a:extLst>
+          </p:cNvPr>
+          <p:cNvGrpSpPr>
+            <a:grpSpLocks noChangeAspect="1"/>
+          </p:cNvGrpSpPr>
+          <p:nvPr/>
+        </p:nvGrpSpPr>
+        <p:grpSpPr>
+          <a:xfrm>
+            <a:off x="1149473" y="1966545"/>
+            <a:ext cx="200941" cy="162000"/>
+            <a:chOff x="1929577" y="539626"/>
+            <a:chExt cx="267950" cy="216024"/>
+          </a:xfrm>
+        </p:grpSpPr>
+        <p:sp>
+          <p:nvSpPr>
+            <p:cNvPr id="40" name="Rounded Rectangle 39">
+              <a:extLst>
+                <a:ext uri="{FF2B5EF4-FFF2-40B4-BE49-F238E27FC236}">
+                  <a16:creationId xmlns:a16="http://schemas.microsoft.com/office/drawing/2014/main" id="{F0235423-C0A3-8D85-0367-434C9FE3941F}"/>
+                </a:ext>
+              </a:extLst>
+            </p:cNvPr>
+            <p:cNvSpPr/>
+            <p:nvPr/>
+          </p:nvSpPr>
+          <p:spPr>
+            <a:xfrm>
+              <a:off x="1929577" y="539626"/>
+              <a:ext cx="267950" cy="216024"/>
+            </a:xfrm>
+            <a:prstGeom prst="roundRect">
+              <a:avLst/>
+            </a:prstGeom>
+            <a:ln/>
+          </p:spPr>
+          <p:style>
+            <a:lnRef idx="2">
+              <a:schemeClr val="accent2">
+                <a:shade val="15000"/>
+              </a:schemeClr>
+            </a:lnRef>
+            <a:fillRef idx="1">
+              <a:schemeClr val="accent2"/>
+            </a:fillRef>
+            <a:effectRef idx="0">
+              <a:schemeClr val="accent2"/>
+            </a:effectRef>
+            <a:fontRef idx="minor">
+              <a:schemeClr val="lt1"/>
+            </a:fontRef>
+          </p:style>
+          <p:txBody>
+            <a:bodyPr rtlCol="0" anchor="ctr"/>
+            <a:lstStyle/>
+            <a:p>
+              <a:pPr algn="ctr"/>
+              <a:endParaRPr lang="en-CH"/>
+            </a:p>
+          </p:txBody>
+        </p:sp>
+        <p:sp>
+          <p:nvSpPr>
+            <p:cNvPr id="41" name="Oval 40">
+              <a:extLst>
+                <a:ext uri="{FF2B5EF4-FFF2-40B4-BE49-F238E27FC236}">
+                  <a16:creationId xmlns:a16="http://schemas.microsoft.com/office/drawing/2014/main" id="{7D60F34E-10A4-2CB0-6253-964B9C5EE823}"/>
+                </a:ext>
+              </a:extLst>
+            </p:cNvPr>
+            <p:cNvSpPr/>
+            <p:nvPr/>
+          </p:nvSpPr>
+          <p:spPr>
+            <a:xfrm>
+              <a:off x="1972783" y="593017"/>
+              <a:ext cx="36000" cy="36000"/>
+            </a:xfrm>
+            <a:prstGeom prst="ellipse">
+              <a:avLst/>
+            </a:prstGeom>
+            <a:ln/>
+          </p:spPr>
+          <p:style>
+            <a:lnRef idx="2">
+              <a:schemeClr val="accent2">
+                <a:shade val="15000"/>
+              </a:schemeClr>
+            </a:lnRef>
+            <a:fillRef idx="1">
+              <a:schemeClr val="accent2"/>
+            </a:fillRef>
+            <a:effectRef idx="0">
+              <a:schemeClr val="accent2"/>
+            </a:effectRef>
+            <a:fontRef idx="minor">
+              <a:schemeClr val="lt1"/>
+            </a:fontRef>
+          </p:style>
+          <p:txBody>
+            <a:bodyPr rtlCol="0" anchor="ctr"/>
+            <a:lstStyle/>
+            <a:p>
+              <a:pPr algn="ctr"/>
+              <a:endParaRPr lang="en-CH"/>
+            </a:p>
+          </p:txBody>
+        </p:sp>
+        <p:sp>
+          <p:nvSpPr>
+            <p:cNvPr id="42" name="Rounded Rectangle 41">
+              <a:extLst>
+                <a:ext uri="{FF2B5EF4-FFF2-40B4-BE49-F238E27FC236}">
+                  <a16:creationId xmlns:a16="http://schemas.microsoft.com/office/drawing/2014/main" id="{53BBBEC2-928F-0C1A-65EF-AC1E16924E95}"/>
+                </a:ext>
+              </a:extLst>
+            </p:cNvPr>
+            <p:cNvSpPr/>
+            <p:nvPr/>
+          </p:nvSpPr>
+          <p:spPr>
+            <a:xfrm>
+              <a:off x="1974502" y="665642"/>
+              <a:ext cx="191665" cy="36000"/>
+            </a:xfrm>
+            <a:prstGeom prst="roundRect">
+              <a:avLst/>
+            </a:prstGeom>
+            <a:ln/>
+          </p:spPr>
+          <p:style>
+            <a:lnRef idx="2">
+              <a:schemeClr val="accent2">
+                <a:shade val="15000"/>
+              </a:schemeClr>
+            </a:lnRef>
+            <a:fillRef idx="1">
+              <a:schemeClr val="accent2"/>
+            </a:fillRef>
+            <a:effectRef idx="0">
+              <a:schemeClr val="accent2"/>
+            </a:effectRef>
+            <a:fontRef idx="minor">
+              <a:schemeClr val="lt1"/>
+            </a:fontRef>
+          </p:style>
+          <p:txBody>
+            <a:bodyPr rtlCol="0" anchor="ctr"/>
+            <a:lstStyle/>
+            <a:p>
+              <a:pPr algn="ctr"/>
+              <a:endParaRPr lang="en-CH"/>
+            </a:p>
+          </p:txBody>
+        </p:sp>
+        <p:sp>
+          <p:nvSpPr>
+            <p:cNvPr id="43" name="Rounded Rectangle 42">
+              <a:extLst>
+                <a:ext uri="{FF2B5EF4-FFF2-40B4-BE49-F238E27FC236}">
+                  <a16:creationId xmlns:a16="http://schemas.microsoft.com/office/drawing/2014/main" id="{9D3328D3-BE14-7EC4-CF30-70B4BC8F70A5}"/>
+                </a:ext>
+              </a:extLst>
+            </p:cNvPr>
+            <p:cNvSpPr/>
+            <p:nvPr/>
+          </p:nvSpPr>
+          <p:spPr>
+            <a:xfrm>
+              <a:off x="2058167" y="593017"/>
+              <a:ext cx="108000" cy="36000"/>
+            </a:xfrm>
+            <a:prstGeom prst="roundRect">
+              <a:avLst/>
+            </a:prstGeom>
+            <a:ln/>
+          </p:spPr>
+          <p:style>
+            <a:lnRef idx="2">
+              <a:schemeClr val="accent2">
+                <a:shade val="15000"/>
+              </a:schemeClr>
+            </a:lnRef>
+            <a:fillRef idx="1">
+              <a:schemeClr val="accent2"/>
+            </a:fillRef>
+            <a:effectRef idx="0">
+              <a:schemeClr val="accent2"/>
+            </a:effectRef>
+            <a:fontRef idx="minor">
+              <a:schemeClr val="lt1"/>
+            </a:fontRef>
+          </p:style>
+          <p:txBody>
+            <a:bodyPr rtlCol="0" anchor="ctr"/>
+            <a:lstStyle/>
+            <a:p>
+              <a:pPr algn="ctr"/>
+              <a:endParaRPr lang="en-CH"/>
+            </a:p>
+          </p:txBody>
+        </p:sp>
+      </p:grpSp>
+      <p:grpSp>
+        <p:nvGrpSpPr>
+          <p:cNvPr id="44" name="Group 43">
+            <a:extLst>
+              <a:ext uri="{FF2B5EF4-FFF2-40B4-BE49-F238E27FC236}">
+                <a16:creationId xmlns:a16="http://schemas.microsoft.com/office/drawing/2014/main" id="{513B08AC-8802-8512-5781-49D263F6697F}"/>
+              </a:ext>
+            </a:extLst>
+          </p:cNvPr>
+          <p:cNvGrpSpPr>
+            <a:grpSpLocks noChangeAspect="1"/>
+          </p:cNvGrpSpPr>
+          <p:nvPr/>
+        </p:nvGrpSpPr>
+        <p:grpSpPr>
+          <a:xfrm>
+            <a:off x="3104539" y="1677259"/>
+            <a:ext cx="200941" cy="162000"/>
+            <a:chOff x="1929577" y="539626"/>
+            <a:chExt cx="267950" cy="216024"/>
+          </a:xfrm>
+        </p:grpSpPr>
+        <p:sp>
+          <p:nvSpPr>
+            <p:cNvPr id="45" name="Rounded Rectangle 44">
+              <a:extLst>
+                <a:ext uri="{FF2B5EF4-FFF2-40B4-BE49-F238E27FC236}">
+                  <a16:creationId xmlns:a16="http://schemas.microsoft.com/office/drawing/2014/main" id="{6AA6B289-64CF-88EF-F949-569B3DC243D7}"/>
+                </a:ext>
+              </a:extLst>
+            </p:cNvPr>
+            <p:cNvSpPr/>
+            <p:nvPr/>
+          </p:nvSpPr>
+          <p:spPr>
+            <a:xfrm>
+              <a:off x="1929577" y="539626"/>
+              <a:ext cx="267950" cy="216024"/>
+            </a:xfrm>
+            <a:prstGeom prst="roundRect">
+              <a:avLst/>
+            </a:prstGeom>
+            <a:ln/>
+          </p:spPr>
+          <p:style>
+            <a:lnRef idx="2">
+              <a:schemeClr val="accent2">
+                <a:shade val="15000"/>
+              </a:schemeClr>
+            </a:lnRef>
+            <a:fillRef idx="1">
+              <a:schemeClr val="accent2"/>
+            </a:fillRef>
+            <a:effectRef idx="0">
+              <a:schemeClr val="accent2"/>
+            </a:effectRef>
+            <a:fontRef idx="minor">
+              <a:schemeClr val="lt1"/>
+            </a:fontRef>
+          </p:style>
+          <p:txBody>
+            <a:bodyPr rtlCol="0" anchor="ctr"/>
+            <a:lstStyle/>
+            <a:p>
+              <a:pPr algn="ctr"/>
+              <a:endParaRPr lang="en-CH"/>
+            </a:p>
+          </p:txBody>
+        </p:sp>
+        <p:sp>
+          <p:nvSpPr>
+            <p:cNvPr id="46" name="Oval 45">
+              <a:extLst>
+                <a:ext uri="{FF2B5EF4-FFF2-40B4-BE49-F238E27FC236}">
+                  <a16:creationId xmlns:a16="http://schemas.microsoft.com/office/drawing/2014/main" id="{D688B045-98F5-EE03-B143-A7270B0B9978}"/>
+                </a:ext>
+              </a:extLst>
+            </p:cNvPr>
+            <p:cNvSpPr/>
+            <p:nvPr/>
+          </p:nvSpPr>
+          <p:spPr>
+            <a:xfrm>
+              <a:off x="1972783" y="593017"/>
+              <a:ext cx="36000" cy="36000"/>
+            </a:xfrm>
+            <a:prstGeom prst="ellipse">
+              <a:avLst/>
+            </a:prstGeom>
+            <a:ln/>
+          </p:spPr>
+          <p:style>
+            <a:lnRef idx="2">
+              <a:schemeClr val="accent2">
+                <a:shade val="15000"/>
+              </a:schemeClr>
+            </a:lnRef>
+            <a:fillRef idx="1">
+              <a:schemeClr val="accent2"/>
+            </a:fillRef>
+            <a:effectRef idx="0">
+              <a:schemeClr val="accent2"/>
+            </a:effectRef>
+            <a:fontRef idx="minor">
+              <a:schemeClr val="lt1"/>
+            </a:fontRef>
+          </p:style>
+          <p:txBody>
+            <a:bodyPr rtlCol="0" anchor="ctr"/>
+            <a:lstStyle/>
+            <a:p>
+              <a:pPr algn="ctr"/>
+              <a:endParaRPr lang="en-CH"/>
+            </a:p>
+          </p:txBody>
+        </p:sp>
+        <p:sp>
+          <p:nvSpPr>
+            <p:cNvPr id="47" name="Rounded Rectangle 46">
+              <a:extLst>
+                <a:ext uri="{FF2B5EF4-FFF2-40B4-BE49-F238E27FC236}">
+                  <a16:creationId xmlns:a16="http://schemas.microsoft.com/office/drawing/2014/main" id="{3FCB7EAC-CF63-D656-BD86-9ED94D0E0855}"/>
+                </a:ext>
+              </a:extLst>
+            </p:cNvPr>
+            <p:cNvSpPr/>
+            <p:nvPr/>
+          </p:nvSpPr>
+          <p:spPr>
+            <a:xfrm>
+              <a:off x="1974502" y="665642"/>
+              <a:ext cx="191665" cy="36000"/>
+            </a:xfrm>
+            <a:prstGeom prst="roundRect">
+              <a:avLst/>
+            </a:prstGeom>
+            <a:ln/>
+          </p:spPr>
+          <p:style>
+            <a:lnRef idx="2">
+              <a:schemeClr val="accent2">
+                <a:shade val="15000"/>
+              </a:schemeClr>
+            </a:lnRef>
+            <a:fillRef idx="1">
+              <a:schemeClr val="accent2"/>
+            </a:fillRef>
+            <a:effectRef idx="0">
+              <a:schemeClr val="accent2"/>
+            </a:effectRef>
+            <a:fontRef idx="minor">
+              <a:schemeClr val="lt1"/>
+            </a:fontRef>
+          </p:style>
+          <p:txBody>
+            <a:bodyPr rtlCol="0" anchor="ctr"/>
+            <a:lstStyle/>
+            <a:p>
+              <a:pPr algn="ctr"/>
+              <a:endParaRPr lang="en-CH"/>
+            </a:p>
+          </p:txBody>
+        </p:sp>
+        <p:sp>
+          <p:nvSpPr>
+            <p:cNvPr id="48" name="Rounded Rectangle 47">
+              <a:extLst>
+                <a:ext uri="{FF2B5EF4-FFF2-40B4-BE49-F238E27FC236}">
+                  <a16:creationId xmlns:a16="http://schemas.microsoft.com/office/drawing/2014/main" id="{5412ED6B-7257-26B0-7DA2-D7D22FD4862A}"/>
+                </a:ext>
+              </a:extLst>
+            </p:cNvPr>
+            <p:cNvSpPr/>
+            <p:nvPr/>
+          </p:nvSpPr>
+          <p:spPr>
+            <a:xfrm>
+              <a:off x="2058167" y="593017"/>
+              <a:ext cx="108000" cy="36000"/>
+            </a:xfrm>
+            <a:prstGeom prst="roundRect">
+              <a:avLst/>
+            </a:prstGeom>
+            <a:ln/>
+          </p:spPr>
+          <p:style>
+            <a:lnRef idx="2">
+              <a:schemeClr val="accent2">
+                <a:shade val="15000"/>
+              </a:schemeClr>
+            </a:lnRef>
+            <a:fillRef idx="1">
+              <a:schemeClr val="accent2"/>
+            </a:fillRef>
+            <a:effectRef idx="0">
+              <a:schemeClr val="accent2"/>
+            </a:effectRef>
+            <a:fontRef idx="minor">
+              <a:schemeClr val="lt1"/>
+            </a:fontRef>
+          </p:style>
+          <p:txBody>
+            <a:bodyPr rtlCol="0" anchor="ctr"/>
+            <a:lstStyle/>
+            <a:p>
+              <a:pPr algn="ctr"/>
+              <a:endParaRPr lang="en-CH"/>
+            </a:p>
+          </p:txBody>
+        </p:sp>
+      </p:grpSp>
+      <p:pic>
+        <p:nvPicPr>
+          <p:cNvPr id="49" name="Picture 48">
+            <a:extLst>
+              <a:ext uri="{FF2B5EF4-FFF2-40B4-BE49-F238E27FC236}">
+                <a16:creationId xmlns:a16="http://schemas.microsoft.com/office/drawing/2014/main" id="{678A276C-B4B9-D45A-7AE4-11DB9C162412}"/>
+              </a:ext>
+            </a:extLst>
+          </p:cNvPr>
+          <p:cNvPicPr>
+            <a:picLocks noChangeAspect="1"/>
+          </p:cNvPicPr>
+          <p:nvPr/>
+        </p:nvPicPr>
+        <p:blipFill>
+          <a:blip r:embed="rId3" cstate="print">
+            <a:duotone>
+              <a:schemeClr val="accent6">
+                <a:shade val="45000"/>
+                <a:satMod val="135000"/>
+              </a:schemeClr>
+              <a:prstClr val="white"/>
+            </a:duotone>
+            <a:extLst>
+              <a:ext uri="{28A0092B-C50C-407E-A947-70E740481C1C}">
+                <a14:useLocalDpi xmlns:a14="http://schemas.microsoft.com/office/drawing/2010/main" val="0"/>
+              </a:ext>
+            </a:extLst>
+          </a:blip>
+          <a:stretch>
+            <a:fillRect/>
+          </a:stretch>
+        </p:blipFill>
+        <p:spPr>
+          <a:xfrm>
+            <a:off x="205468" y="1248580"/>
+            <a:ext cx="200102" cy="200102"/>
+          </a:xfrm>
+          <a:prstGeom prst="rect">
+            <a:avLst/>
+          </a:prstGeom>
+        </p:spPr>
+      </p:pic>
+      <p:pic>
+        <p:nvPicPr>
+          <p:cNvPr id="50" name="Picture 49">
+            <a:extLst>
+              <a:ext uri="{FF2B5EF4-FFF2-40B4-BE49-F238E27FC236}">
+                <a16:creationId xmlns:a16="http://schemas.microsoft.com/office/drawing/2014/main" id="{07E79053-B65E-B588-7939-55C226504083}"/>
+              </a:ext>
+            </a:extLst>
+          </p:cNvPr>
+          <p:cNvPicPr>
+            <a:picLocks noChangeAspect="1"/>
+          </p:cNvPicPr>
+          <p:nvPr/>
+        </p:nvPicPr>
+        <p:blipFill>
+          <a:blip r:embed="rId3" cstate="print">
+            <a:duotone>
+              <a:schemeClr val="accent6">
+                <a:shade val="45000"/>
+                <a:satMod val="135000"/>
+              </a:schemeClr>
+              <a:prstClr val="white"/>
+            </a:duotone>
+            <a:extLst>
+              <a:ext uri="{28A0092B-C50C-407E-A947-70E740481C1C}">
+                <a14:useLocalDpi xmlns:a14="http://schemas.microsoft.com/office/drawing/2010/main" val="0"/>
+              </a:ext>
+            </a:extLst>
+          </a:blip>
+          <a:stretch>
+            <a:fillRect/>
+          </a:stretch>
+        </p:blipFill>
+        <p:spPr>
+          <a:xfrm>
+            <a:off x="922356" y="1945152"/>
+            <a:ext cx="200102" cy="200102"/>
+          </a:xfrm>
+          <a:prstGeom prst="rect">
+            <a:avLst/>
+          </a:prstGeom>
+        </p:spPr>
+      </p:pic>
+      <p:pic>
+        <p:nvPicPr>
+          <p:cNvPr id="51" name="Picture 50">
+            <a:extLst>
+              <a:ext uri="{FF2B5EF4-FFF2-40B4-BE49-F238E27FC236}">
+                <a16:creationId xmlns:a16="http://schemas.microsoft.com/office/drawing/2014/main" id="{F828F67A-39DA-8931-9061-7CFD2F06736D}"/>
+              </a:ext>
+            </a:extLst>
+          </p:cNvPr>
+          <p:cNvPicPr>
+            <a:picLocks noChangeAspect="1"/>
+          </p:cNvPicPr>
+          <p:nvPr/>
+        </p:nvPicPr>
+        <p:blipFill>
+          <a:blip r:embed="rId3" cstate="print">
+            <a:duotone>
+              <a:schemeClr val="accent6">
+                <a:shade val="45000"/>
+                <a:satMod val="135000"/>
+              </a:schemeClr>
+              <a:prstClr val="white"/>
+            </a:duotone>
+            <a:extLst>
+              <a:ext uri="{28A0092B-C50C-407E-A947-70E740481C1C}">
+                <a14:useLocalDpi xmlns:a14="http://schemas.microsoft.com/office/drawing/2010/main" val="0"/>
+              </a:ext>
+            </a:extLst>
+          </a:blip>
+          <a:stretch>
+            <a:fillRect/>
+          </a:stretch>
+        </p:blipFill>
+        <p:spPr>
+          <a:xfrm>
+            <a:off x="1682613" y="1013769"/>
+            <a:ext cx="200102" cy="200102"/>
+          </a:xfrm>
+          <a:prstGeom prst="rect">
+            <a:avLst/>
+          </a:prstGeom>
+        </p:spPr>
+      </p:pic>
+      <p:pic>
+        <p:nvPicPr>
+          <p:cNvPr id="52" name="Picture 51">
+            <a:extLst>
+              <a:ext uri="{FF2B5EF4-FFF2-40B4-BE49-F238E27FC236}">
+                <a16:creationId xmlns:a16="http://schemas.microsoft.com/office/drawing/2014/main" id="{B0D2AEC4-4891-3C85-346D-2C1A0AFF47E8}"/>
+              </a:ext>
+            </a:extLst>
+          </p:cNvPr>
+          <p:cNvPicPr>
+            <a:picLocks noChangeAspect="1"/>
+          </p:cNvPicPr>
+          <p:nvPr/>
+        </p:nvPicPr>
+        <p:blipFill>
+          <a:blip r:embed="rId3" cstate="print">
+            <a:duotone>
+              <a:schemeClr val="accent6">
+                <a:shade val="45000"/>
+                <a:satMod val="135000"/>
+              </a:schemeClr>
+              <a:prstClr val="white"/>
+            </a:duotone>
+            <a:extLst>
+              <a:ext uri="{28A0092B-C50C-407E-A947-70E740481C1C}">
+                <a14:useLocalDpi xmlns:a14="http://schemas.microsoft.com/office/drawing/2010/main" val="0"/>
+              </a:ext>
+            </a:extLst>
+          </a:blip>
+          <a:stretch>
+            <a:fillRect/>
+          </a:stretch>
+        </p:blipFill>
+        <p:spPr>
+          <a:xfrm>
+            <a:off x="2467383" y="1035525"/>
+            <a:ext cx="200102" cy="200102"/>
+          </a:xfrm>
+          <a:prstGeom prst="rect">
+            <a:avLst/>
+          </a:prstGeom>
+        </p:spPr>
+      </p:pic>
+      <p:pic>
+        <p:nvPicPr>
+          <p:cNvPr id="53" name="Picture 52">
+            <a:extLst>
+              <a:ext uri="{FF2B5EF4-FFF2-40B4-BE49-F238E27FC236}">
+                <a16:creationId xmlns:a16="http://schemas.microsoft.com/office/drawing/2014/main" id="{86381472-178D-A4CD-F845-8E084467B444}"/>
+              </a:ext>
+            </a:extLst>
+          </p:cNvPr>
+          <p:cNvPicPr>
+            <a:picLocks noChangeAspect="1"/>
+          </p:cNvPicPr>
+          <p:nvPr/>
+        </p:nvPicPr>
+        <p:blipFill>
+          <a:blip r:embed="rId3" cstate="print">
+            <a:duotone>
+              <a:schemeClr val="accent6">
+                <a:shade val="45000"/>
+                <a:satMod val="135000"/>
+              </a:schemeClr>
+              <a:prstClr val="white"/>
+            </a:duotone>
+            <a:extLst>
+              <a:ext uri="{28A0092B-C50C-407E-A947-70E740481C1C}">
+                <a14:useLocalDpi xmlns:a14="http://schemas.microsoft.com/office/drawing/2010/main" val="0"/>
+              </a:ext>
+            </a:extLst>
+          </a:blip>
+          <a:stretch>
+            <a:fillRect/>
+          </a:stretch>
+        </p:blipFill>
+        <p:spPr>
+          <a:xfrm>
+            <a:off x="3112270" y="1855768"/>
+            <a:ext cx="200102" cy="200102"/>
+          </a:xfrm>
+          <a:prstGeom prst="rect">
+            <a:avLst/>
+          </a:prstGeom>
+        </p:spPr>
+      </p:pic>
+      <p:pic>
+        <p:nvPicPr>
+          <p:cNvPr id="54" name="Picture 53">
+            <a:extLst>
+              <a:ext uri="{FF2B5EF4-FFF2-40B4-BE49-F238E27FC236}">
+                <a16:creationId xmlns:a16="http://schemas.microsoft.com/office/drawing/2014/main" id="{D3D3EA10-6A79-BBAD-A7A6-2B82450CCAD5}"/>
+              </a:ext>
+            </a:extLst>
+          </p:cNvPr>
+          <p:cNvPicPr>
+            <a:picLocks noChangeAspect="1"/>
+          </p:cNvPicPr>
+          <p:nvPr/>
+        </p:nvPicPr>
+        <p:blipFill>
+          <a:blip r:embed="rId3" cstate="print">
+            <a:duotone>
+              <a:schemeClr val="accent6">
+                <a:shade val="45000"/>
+                <a:satMod val="135000"/>
+              </a:schemeClr>
+              <a:prstClr val="white"/>
+            </a:duotone>
+            <a:extLst>
+              <a:ext uri="{28A0092B-C50C-407E-A947-70E740481C1C}">
+                <a14:useLocalDpi xmlns:a14="http://schemas.microsoft.com/office/drawing/2010/main" val="0"/>
+              </a:ext>
+            </a:extLst>
+          </a:blip>
+          <a:stretch>
+            <a:fillRect/>
+          </a:stretch>
+        </p:blipFill>
+        <p:spPr>
+          <a:xfrm>
+            <a:off x="3807811" y="1019028"/>
+            <a:ext cx="200102" cy="200102"/>
+          </a:xfrm>
+          <a:prstGeom prst="rect">
+            <a:avLst/>
+          </a:prstGeom>
+        </p:spPr>
+      </p:pic>
+      <p:sp>
+        <p:nvSpPr>
+          <p:cNvPr id="63" name="Rectangle 62">
+            <a:extLst>
+              <a:ext uri="{FF2B5EF4-FFF2-40B4-BE49-F238E27FC236}">
+                <a16:creationId xmlns:a16="http://schemas.microsoft.com/office/drawing/2014/main" id="{4DEC179C-7793-0D74-D068-906623636802}"/>
               </a:ext>
             </a:extLst>
           </p:cNvPr>
@@ -3407,19 +5054,17 @@
         </p:nvSpPr>
         <p:spPr>
           <a:xfrm>
-            <a:off x="1972490" y="1010875"/>
-            <a:ext cx="2184384" cy="257576"/>
+            <a:off x="0" y="-2"/>
+            <a:ext cx="938580" cy="532131"/>
           </a:xfrm>
           <a:prstGeom prst="rect">
             <a:avLst/>
           </a:prstGeom>
-          <a:noFill/>
-          <a:ln w="28575">
-            <a:solidFill>
-              <a:schemeClr val="accent1"/>
-            </a:solidFill>
-            <a:prstDash val="sysDash"/>
-          </a:ln>
+          <a:solidFill>
+            <a:srgbClr val="D9D9D9">
+              <a:alpha val="50196"/>
+            </a:srgbClr>
+          </a:solidFill>
         </p:spPr>
         <p:style>
           <a:lnRef idx="2">
@@ -3446,56 +5091,335 @@
           </a:p>
         </p:txBody>
       </p:sp>
-      <p:sp>
-        <p:nvSpPr>
-          <p:cNvPr id="18" name="Rectangle 17">
+      <p:grpSp>
+        <p:nvGrpSpPr>
+          <p:cNvPr id="55" name="Group 54">
             <a:extLst>
               <a:ext uri="{FF2B5EF4-FFF2-40B4-BE49-F238E27FC236}">
-                <a16:creationId xmlns:a16="http://schemas.microsoft.com/office/drawing/2014/main" id="{BB1E01B7-EAAE-5DE1-F7DF-5B83A7DC68DE}"/>
+                <a16:creationId xmlns:a16="http://schemas.microsoft.com/office/drawing/2014/main" id="{A64B080A-F119-20FC-990D-A5BDD74E1684}"/>
               </a:ext>
             </a:extLst>
           </p:cNvPr>
-          <p:cNvSpPr/>
+          <p:cNvGrpSpPr>
+            <a:grpSpLocks noChangeAspect="1"/>
+          </p:cNvGrpSpPr>
           <p:nvPr/>
-        </p:nvSpPr>
+        </p:nvGrpSpPr>
+        <p:grpSpPr>
+          <a:xfrm>
+            <a:off x="48481" y="92239"/>
+            <a:ext cx="200941" cy="162000"/>
+            <a:chOff x="1929577" y="539626"/>
+            <a:chExt cx="267950" cy="216024"/>
+          </a:xfrm>
+        </p:grpSpPr>
+        <p:sp>
+          <p:nvSpPr>
+            <p:cNvPr id="56" name="Rounded Rectangle 55">
+              <a:extLst>
+                <a:ext uri="{FF2B5EF4-FFF2-40B4-BE49-F238E27FC236}">
+                  <a16:creationId xmlns:a16="http://schemas.microsoft.com/office/drawing/2014/main" id="{6FA0DD4E-29F0-E493-8868-16C9F4E18B2D}"/>
+                </a:ext>
+              </a:extLst>
+            </p:cNvPr>
+            <p:cNvSpPr/>
+            <p:nvPr/>
+          </p:nvSpPr>
+          <p:spPr>
+            <a:xfrm>
+              <a:off x="1929577" y="539626"/>
+              <a:ext cx="267950" cy="216024"/>
+            </a:xfrm>
+            <a:prstGeom prst="roundRect">
+              <a:avLst/>
+            </a:prstGeom>
+            <a:ln/>
+          </p:spPr>
+          <p:style>
+            <a:lnRef idx="2">
+              <a:schemeClr val="accent2">
+                <a:shade val="15000"/>
+              </a:schemeClr>
+            </a:lnRef>
+            <a:fillRef idx="1">
+              <a:schemeClr val="accent2"/>
+            </a:fillRef>
+            <a:effectRef idx="0">
+              <a:schemeClr val="accent2"/>
+            </a:effectRef>
+            <a:fontRef idx="minor">
+              <a:schemeClr val="lt1"/>
+            </a:fontRef>
+          </p:style>
+          <p:txBody>
+            <a:bodyPr rtlCol="0" anchor="ctr"/>
+            <a:lstStyle/>
+            <a:p>
+              <a:pPr algn="ctr"/>
+              <a:endParaRPr lang="en-CH"/>
+            </a:p>
+          </p:txBody>
+        </p:sp>
+        <p:sp>
+          <p:nvSpPr>
+            <p:cNvPr id="57" name="Oval 56">
+              <a:extLst>
+                <a:ext uri="{FF2B5EF4-FFF2-40B4-BE49-F238E27FC236}">
+                  <a16:creationId xmlns:a16="http://schemas.microsoft.com/office/drawing/2014/main" id="{6146BB66-FBAC-E1A2-5D7F-7639DF89A635}"/>
+                </a:ext>
+              </a:extLst>
+            </p:cNvPr>
+            <p:cNvSpPr/>
+            <p:nvPr/>
+          </p:nvSpPr>
+          <p:spPr>
+            <a:xfrm>
+              <a:off x="1972783" y="593017"/>
+              <a:ext cx="36000" cy="36000"/>
+            </a:xfrm>
+            <a:prstGeom prst="ellipse">
+              <a:avLst/>
+            </a:prstGeom>
+            <a:ln/>
+          </p:spPr>
+          <p:style>
+            <a:lnRef idx="2">
+              <a:schemeClr val="accent2">
+                <a:shade val="15000"/>
+              </a:schemeClr>
+            </a:lnRef>
+            <a:fillRef idx="1">
+              <a:schemeClr val="accent2"/>
+            </a:fillRef>
+            <a:effectRef idx="0">
+              <a:schemeClr val="accent2"/>
+            </a:effectRef>
+            <a:fontRef idx="minor">
+              <a:schemeClr val="lt1"/>
+            </a:fontRef>
+          </p:style>
+          <p:txBody>
+            <a:bodyPr rtlCol="0" anchor="ctr"/>
+            <a:lstStyle/>
+            <a:p>
+              <a:pPr algn="ctr"/>
+              <a:endParaRPr lang="en-CH"/>
+            </a:p>
+          </p:txBody>
+        </p:sp>
+        <p:sp>
+          <p:nvSpPr>
+            <p:cNvPr id="58" name="Rounded Rectangle 57">
+              <a:extLst>
+                <a:ext uri="{FF2B5EF4-FFF2-40B4-BE49-F238E27FC236}">
+                  <a16:creationId xmlns:a16="http://schemas.microsoft.com/office/drawing/2014/main" id="{35FB283E-3F23-D5B4-84D0-61E4BD5E7A03}"/>
+                </a:ext>
+              </a:extLst>
+            </p:cNvPr>
+            <p:cNvSpPr/>
+            <p:nvPr/>
+          </p:nvSpPr>
+          <p:spPr>
+            <a:xfrm>
+              <a:off x="1974502" y="665642"/>
+              <a:ext cx="191665" cy="36000"/>
+            </a:xfrm>
+            <a:prstGeom prst="roundRect">
+              <a:avLst/>
+            </a:prstGeom>
+            <a:ln/>
+          </p:spPr>
+          <p:style>
+            <a:lnRef idx="2">
+              <a:schemeClr val="accent2">
+                <a:shade val="15000"/>
+              </a:schemeClr>
+            </a:lnRef>
+            <a:fillRef idx="1">
+              <a:schemeClr val="accent2"/>
+            </a:fillRef>
+            <a:effectRef idx="0">
+              <a:schemeClr val="accent2"/>
+            </a:effectRef>
+            <a:fontRef idx="minor">
+              <a:schemeClr val="lt1"/>
+            </a:fontRef>
+          </p:style>
+          <p:txBody>
+            <a:bodyPr rtlCol="0" anchor="ctr"/>
+            <a:lstStyle/>
+            <a:p>
+              <a:pPr algn="ctr"/>
+              <a:endParaRPr lang="en-CH"/>
+            </a:p>
+          </p:txBody>
+        </p:sp>
+        <p:sp>
+          <p:nvSpPr>
+            <p:cNvPr id="59" name="Rounded Rectangle 58">
+              <a:extLst>
+                <a:ext uri="{FF2B5EF4-FFF2-40B4-BE49-F238E27FC236}">
+                  <a16:creationId xmlns:a16="http://schemas.microsoft.com/office/drawing/2014/main" id="{2ACC23CB-1CEB-C136-8352-757C5E865BDC}"/>
+                </a:ext>
+              </a:extLst>
+            </p:cNvPr>
+            <p:cNvSpPr/>
+            <p:nvPr/>
+          </p:nvSpPr>
+          <p:spPr>
+            <a:xfrm>
+              <a:off x="2058167" y="593017"/>
+              <a:ext cx="108000" cy="36000"/>
+            </a:xfrm>
+            <a:prstGeom prst="roundRect">
+              <a:avLst/>
+            </a:prstGeom>
+            <a:ln/>
+          </p:spPr>
+          <p:style>
+            <a:lnRef idx="2">
+              <a:schemeClr val="accent2">
+                <a:shade val="15000"/>
+              </a:schemeClr>
+            </a:lnRef>
+            <a:fillRef idx="1">
+              <a:schemeClr val="accent2"/>
+            </a:fillRef>
+            <a:effectRef idx="0">
+              <a:schemeClr val="accent2"/>
+            </a:effectRef>
+            <a:fontRef idx="minor">
+              <a:schemeClr val="lt1"/>
+            </a:fontRef>
+          </p:style>
+          <p:txBody>
+            <a:bodyPr rtlCol="0" anchor="ctr"/>
+            <a:lstStyle/>
+            <a:p>
+              <a:pPr algn="ctr"/>
+              <a:endParaRPr lang="en-CH"/>
+            </a:p>
+          </p:txBody>
+        </p:sp>
+      </p:grpSp>
+      <p:pic>
+        <p:nvPicPr>
+          <p:cNvPr id="60" name="Picture 59">
+            <a:extLst>
+              <a:ext uri="{FF2B5EF4-FFF2-40B4-BE49-F238E27FC236}">
+                <a16:creationId xmlns:a16="http://schemas.microsoft.com/office/drawing/2014/main" id="{DBA5D32A-6FC2-2171-9852-0A82E7B2C9E8}"/>
+              </a:ext>
+            </a:extLst>
+          </p:cNvPr>
+          <p:cNvPicPr>
+            <a:picLocks noChangeAspect="1"/>
+          </p:cNvPicPr>
+          <p:nvPr/>
+        </p:nvPicPr>
+        <p:blipFill>
+          <a:blip r:embed="rId3" cstate="print">
+            <a:duotone>
+              <a:schemeClr val="accent6">
+                <a:shade val="45000"/>
+                <a:satMod val="135000"/>
+              </a:schemeClr>
+              <a:prstClr val="white"/>
+            </a:duotone>
+            <a:extLst>
+              <a:ext uri="{28A0092B-C50C-407E-A947-70E740481C1C}">
+                <a14:useLocalDpi xmlns:a14="http://schemas.microsoft.com/office/drawing/2010/main" val="0"/>
+              </a:ext>
+            </a:extLst>
+          </a:blip>
+          <a:stretch>
+            <a:fillRect/>
+          </a:stretch>
+        </p:blipFill>
         <p:spPr>
           <a:xfrm>
-            <a:off x="3060007" y="1319425"/>
-            <a:ext cx="1035159" cy="752954"/>
+            <a:off x="63925" y="280536"/>
+            <a:ext cx="200102" cy="200102"/>
+          </a:xfrm>
+          <a:prstGeom prst="rect">
+            <a:avLst/>
+          </a:prstGeom>
+        </p:spPr>
+      </p:pic>
+      <p:sp>
+        <p:nvSpPr>
+          <p:cNvPr id="61" name="TextBox 60">
+            <a:extLst>
+              <a:ext uri="{FF2B5EF4-FFF2-40B4-BE49-F238E27FC236}">
+                <a16:creationId xmlns:a16="http://schemas.microsoft.com/office/drawing/2014/main" id="{6C55E4B3-6C02-8B8E-3CE7-1E9363304249}"/>
+              </a:ext>
+            </a:extLst>
+          </p:cNvPr>
+          <p:cNvSpPr txBox="1"/>
+          <p:nvPr/>
+        </p:nvSpPr>
+        <p:spPr>
+          <a:xfrm>
+            <a:off x="211323" y="274157"/>
+            <a:ext cx="836002" cy="215444"/>
           </a:xfrm>
           <a:prstGeom prst="rect">
             <a:avLst/>
           </a:prstGeom>
           <a:noFill/>
-          <a:ln w="28575">
-            <a:solidFill>
-              <a:schemeClr val="accent1"/>
-            </a:solidFill>
-            <a:prstDash val="sysDash"/>
-          </a:ln>
         </p:spPr>
-        <p:style>
-          <a:lnRef idx="2">
-            <a:schemeClr val="accent1">
-              <a:shade val="15000"/>
-            </a:schemeClr>
-          </a:lnRef>
-          <a:fillRef idx="1">
-            <a:schemeClr val="accent1"/>
-          </a:fillRef>
-          <a:effectRef idx="0">
-            <a:schemeClr val="accent1"/>
-          </a:effectRef>
-          <a:fontRef idx="minor">
-            <a:schemeClr val="lt1"/>
-          </a:fontRef>
-        </p:style>
-        <p:txBody>
-          <a:bodyPr rtlCol="0" anchor="ctr"/>
-          <a:lstStyle/>
-          <a:p>
-            <a:pPr algn="ctr"/>
-            <a:endParaRPr lang="en-CH"/>
+        <p:txBody>
+          <a:bodyPr wrap="square" rtlCol="0">
+            <a:spAutoFit/>
+          </a:bodyPr>
+          <a:lstStyle/>
+          <a:p>
+            <a:r>
+              <a:rPr lang="en-CH" sz="800" dirty="0"/>
+              <a:t>Video sensor</a:t>
+            </a:r>
+          </a:p>
+        </p:txBody>
+      </p:sp>
+      <p:sp>
+        <p:nvSpPr>
+          <p:cNvPr id="62" name="TextBox 61">
+            <a:extLst>
+              <a:ext uri="{FF2B5EF4-FFF2-40B4-BE49-F238E27FC236}">
+                <a16:creationId xmlns:a16="http://schemas.microsoft.com/office/drawing/2014/main" id="{4DDCA45D-4C3F-8D7A-1506-867F53A9E40E}"/>
+              </a:ext>
+            </a:extLst>
+          </p:cNvPr>
+          <p:cNvSpPr txBox="1"/>
+          <p:nvPr/>
+        </p:nvSpPr>
+        <p:spPr>
+          <a:xfrm>
+            <a:off x="212605" y="74894"/>
+            <a:ext cx="836002" cy="215444"/>
+          </a:xfrm>
+          <a:prstGeom prst="rect">
+            <a:avLst/>
+          </a:prstGeom>
+          <a:noFill/>
+        </p:spPr>
+        <p:txBody>
+          <a:bodyPr wrap="square" rtlCol="0">
+            <a:spAutoFit/>
+          </a:bodyPr>
+          <a:lstStyle/>
+          <a:p>
+            <a:r>
+              <a:rPr lang="en-CH" sz="800" dirty="0"/>
+              <a:t>CO</a:t>
+            </a:r>
+            <a:r>
+              <a:rPr lang="en-CH" sz="800" baseline="-25000" dirty="0"/>
+              <a:t>2</a:t>
+            </a:r>
+            <a:r>
+              <a:rPr lang="en-CH" sz="800" dirty="0"/>
+              <a:t> device</a:t>
+            </a:r>
           </a:p>
         </p:txBody>
       </p:sp>

</xml_diff>